<commit_message>
2nd 1 level dfd added
</commit_message>
<xml_diff>
--- a/report/dfd.pptx
+++ b/report/dfd.pptx
@@ -8,6 +8,7 @@
     <p:sldId id="258" r:id="rId2"/>
     <p:sldId id="259" r:id="rId3"/>
     <p:sldId id="260" r:id="rId4"/>
+    <p:sldId id="261" r:id="rId5"/>
   </p:sldIdLst>
   <p:sldSz cx="9144000" cy="6858000" type="screen4x3"/>
   <p:notesSz cx="6858000" cy="9144000"/>
@@ -4709,10 +4710,10 @@
           <a:p>
             <a:pPr algn="ctr"/>
             <a:r>
-              <a:rPr lang="en-US" sz="1400" dirty="0" smtClean="0"/>
+              <a:rPr lang="en-US" sz="1400" b="1" dirty="0" smtClean="0"/>
               <a:t>Daily Note Book &amp; Social Networking Updater</a:t>
             </a:r>
-            <a:endParaRPr lang="en-US" sz="1400" dirty="0"/>
+            <a:endParaRPr lang="en-US" sz="1400" b="1" dirty="0"/>
           </a:p>
         </p:txBody>
       </p:sp>
@@ -4738,7 +4739,7 @@
           </p:nvSpPr>
           <p:spPr>
             <a:xfrm>
-              <a:off x="4724400" y="914400"/>
+              <a:off x="4800600" y="914400"/>
               <a:ext cx="522900" cy="307777"/>
             </a:xfrm>
             <a:prstGeom prst="rect">
@@ -8812,10 +8813,10 @@
             <a:p>
               <a:pPr algn="ctr"/>
               <a:r>
-                <a:rPr lang="en-US" sz="1400" dirty="0" smtClean="0"/>
+                <a:rPr lang="en-US" sz="1400" b="1" dirty="0" smtClean="0"/>
                 <a:t>Daily Note Book &amp; Social Networking Updater</a:t>
               </a:r>
-              <a:endParaRPr lang="en-US" sz="1400" dirty="0"/>
+              <a:endParaRPr lang="en-US" sz="1400" b="1" dirty="0"/>
             </a:p>
           </p:txBody>
         </p:sp>
@@ -9665,15 +9666,15 @@
         <p:nvCxnSpPr>
           <p:cNvPr id="37" name="Elbow Connector 36"/>
           <p:cNvCxnSpPr>
-            <a:stCxn id="6" idx="3"/>
-            <a:endCxn id="8" idx="1"/>
+            <a:stCxn id="7" idx="2"/>
+            <a:endCxn id="6" idx="3"/>
           </p:cNvCxnSpPr>
           <p:nvPr/>
         </p:nvCxnSpPr>
         <p:spPr>
-          <a:xfrm>
-            <a:off x="2209800" y="1409700"/>
-            <a:ext cx="1219200" cy="1071890"/>
+          <a:xfrm rot="10800000">
+            <a:off x="2209801" y="1409700"/>
+            <a:ext cx="1285461" cy="990600"/>
           </a:xfrm>
           <a:prstGeom prst="bentConnector3">
             <a:avLst>
@@ -10020,7 +10021,7 @@
         </p:nvSpPr>
         <p:spPr>
           <a:xfrm rot="16200000">
-            <a:off x="2456545" y="1810655"/>
+            <a:off x="2456545" y="1658255"/>
             <a:ext cx="1033488" cy="307777"/>
           </a:xfrm>
           <a:prstGeom prst="rect">
@@ -10126,11 +10127,7 @@
           <a:p>
             <a:r>
               <a:rPr lang="en-US" sz="1400" dirty="0" smtClean="0"/>
-              <a:t>User </a:t>
-            </a:r>
-            <a:r>
-              <a:rPr lang="en-US" sz="1400" dirty="0" smtClean="0"/>
-              <a:t>login info</a:t>
+              <a:t>User login info</a:t>
             </a:r>
             <a:endParaRPr lang="en-US" sz="1400" dirty="0"/>
           </a:p>
@@ -10231,6 +10228,1702 @@
               <a:t>1</a:t>
             </a:r>
             <a:endParaRPr lang="en-US" dirty="0"/>
+          </a:p>
+        </p:txBody>
+      </p:sp>
+    </p:spTree>
+  </p:cSld>
+  <p:clrMapOvr>
+    <a:masterClrMapping/>
+  </p:clrMapOvr>
+</p:sld>
+</file>
+
+<file path=ppt/slides/slide4.xml><?xml version="1.0" encoding="utf-8"?>
+<p:sld xmlns:a="http://schemas.openxmlformats.org/drawingml/2006/main" xmlns:r="http://schemas.openxmlformats.org/officeDocument/2006/relationships" xmlns:p="http://schemas.openxmlformats.org/presentationml/2006/main">
+  <p:cSld>
+    <p:spTree>
+      <p:nvGrpSpPr>
+        <p:cNvPr id="1" name=""/>
+        <p:cNvGrpSpPr/>
+        <p:nvPr/>
+      </p:nvGrpSpPr>
+      <p:grpSpPr>
+        <a:xfrm>
+          <a:off x="0" y="0"/>
+          <a:ext cx="0" cy="0"/>
+          <a:chOff x="0" y="0"/>
+          <a:chExt cx="0" cy="0"/>
+        </a:xfrm>
+      </p:grpSpPr>
+      <p:grpSp>
+        <p:nvGrpSpPr>
+          <p:cNvPr id="4" name="Group 8"/>
+          <p:cNvGrpSpPr/>
+          <p:nvPr/>
+        </p:nvGrpSpPr>
+        <p:grpSpPr>
+          <a:xfrm>
+            <a:off x="4876800" y="4572000"/>
+            <a:ext cx="1828800" cy="1219200"/>
+            <a:chOff x="3733800" y="2286000"/>
+            <a:chExt cx="1828800" cy="1219200"/>
+          </a:xfrm>
+        </p:grpSpPr>
+        <p:sp>
+          <p:nvSpPr>
+            <p:cNvPr id="2" name="Oval 1"/>
+            <p:cNvSpPr/>
+            <p:nvPr/>
+          </p:nvSpPr>
+          <p:spPr>
+            <a:xfrm>
+              <a:off x="3733800" y="2286000"/>
+              <a:ext cx="1828800" cy="1219200"/>
+            </a:xfrm>
+            <a:prstGeom prst="ellipse">
+              <a:avLst/>
+            </a:prstGeom>
+            <a:noFill/>
+            <a:ln>
+              <a:solidFill>
+                <a:schemeClr val="tx1"/>
+              </a:solidFill>
+            </a:ln>
+          </p:spPr>
+          <p:style>
+            <a:lnRef idx="2">
+              <a:schemeClr val="accent1">
+                <a:shade val="50000"/>
+              </a:schemeClr>
+            </a:lnRef>
+            <a:fillRef idx="1">
+              <a:schemeClr val="accent1"/>
+            </a:fillRef>
+            <a:effectRef idx="0">
+              <a:schemeClr val="accent1"/>
+            </a:effectRef>
+            <a:fontRef idx="minor">
+              <a:schemeClr val="lt1"/>
+            </a:fontRef>
+          </p:style>
+          <p:txBody>
+            <a:bodyPr rtlCol="0" anchor="ctr"/>
+            <a:lstStyle/>
+            <a:p>
+              <a:pPr algn="ctr"/>
+              <a:endParaRPr lang="en-US"/>
+            </a:p>
+          </p:txBody>
+        </p:sp>
+        <p:sp>
+          <p:nvSpPr>
+            <p:cNvPr id="3" name="TextBox 2"/>
+            <p:cNvSpPr txBox="1"/>
+            <p:nvPr/>
+          </p:nvSpPr>
+          <p:spPr>
+            <a:xfrm>
+              <a:off x="3886200" y="2590800"/>
+              <a:ext cx="1590261" cy="738664"/>
+            </a:xfrm>
+            <a:prstGeom prst="rect">
+              <a:avLst/>
+            </a:prstGeom>
+            <a:noFill/>
+          </p:spPr>
+          <p:txBody>
+            <a:bodyPr wrap="square" rtlCol="0">
+              <a:spAutoFit/>
+            </a:bodyPr>
+            <a:lstStyle/>
+            <a:p>
+              <a:pPr algn="ctr"/>
+              <a:r>
+                <a:rPr lang="en-US" sz="1400" b="1" dirty="0" smtClean="0"/>
+                <a:t>Daily Note Book &amp; Social Networking Updater</a:t>
+              </a:r>
+              <a:endParaRPr lang="en-US" sz="1400" b="1" dirty="0"/>
+            </a:p>
+          </p:txBody>
+        </p:sp>
+      </p:grpSp>
+      <p:grpSp>
+        <p:nvGrpSpPr>
+          <p:cNvPr id="9" name="Group 25"/>
+          <p:cNvGrpSpPr/>
+          <p:nvPr/>
+        </p:nvGrpSpPr>
+        <p:grpSpPr>
+          <a:xfrm>
+            <a:off x="1143000" y="1219200"/>
+            <a:ext cx="1066800" cy="523220"/>
+            <a:chOff x="4495800" y="914400"/>
+            <a:chExt cx="1066800" cy="523220"/>
+          </a:xfrm>
+        </p:grpSpPr>
+        <p:sp>
+          <p:nvSpPr>
+            <p:cNvPr id="5" name="TextBox 4"/>
+            <p:cNvSpPr txBox="1"/>
+            <p:nvPr/>
+          </p:nvSpPr>
+          <p:spPr>
+            <a:xfrm>
+              <a:off x="4572000" y="914400"/>
+              <a:ext cx="952184" cy="523220"/>
+            </a:xfrm>
+            <a:prstGeom prst="rect">
+              <a:avLst/>
+            </a:prstGeom>
+            <a:noFill/>
+          </p:spPr>
+          <p:txBody>
+            <a:bodyPr wrap="none" rtlCol="0">
+              <a:spAutoFit/>
+            </a:bodyPr>
+            <a:lstStyle/>
+            <a:p>
+              <a:r>
+                <a:rPr lang="en-US" sz="1400" dirty="0" smtClean="0"/>
+                <a:t>Note Book</a:t>
+              </a:r>
+            </a:p>
+            <a:p>
+              <a:endParaRPr lang="en-US" sz="1400" dirty="0"/>
+            </a:p>
+          </p:txBody>
+        </p:sp>
+        <p:sp>
+          <p:nvSpPr>
+            <p:cNvPr id="6" name="Rectangle 5"/>
+            <p:cNvSpPr/>
+            <p:nvPr/>
+          </p:nvSpPr>
+          <p:spPr>
+            <a:xfrm>
+              <a:off x="4495800" y="914400"/>
+              <a:ext cx="1066800" cy="381000"/>
+            </a:xfrm>
+            <a:prstGeom prst="rect">
+              <a:avLst/>
+            </a:prstGeom>
+            <a:noFill/>
+            <a:ln>
+              <a:solidFill>
+                <a:schemeClr val="tx1"/>
+              </a:solidFill>
+            </a:ln>
+          </p:spPr>
+          <p:style>
+            <a:lnRef idx="2">
+              <a:schemeClr val="accent1">
+                <a:shade val="50000"/>
+              </a:schemeClr>
+            </a:lnRef>
+            <a:fillRef idx="1">
+              <a:schemeClr val="accent1"/>
+            </a:fillRef>
+            <a:effectRef idx="0">
+              <a:schemeClr val="accent1"/>
+            </a:effectRef>
+            <a:fontRef idx="minor">
+              <a:schemeClr val="lt1"/>
+            </a:fontRef>
+          </p:style>
+          <p:txBody>
+            <a:bodyPr rtlCol="0" anchor="ctr"/>
+            <a:lstStyle/>
+            <a:p>
+              <a:pPr algn="ctr"/>
+              <a:endParaRPr lang="en-US"/>
+            </a:p>
+          </p:txBody>
+        </p:sp>
+      </p:grpSp>
+      <p:grpSp>
+        <p:nvGrpSpPr>
+          <p:cNvPr id="11" name="Group 11"/>
+          <p:cNvGrpSpPr/>
+          <p:nvPr/>
+        </p:nvGrpSpPr>
+        <p:grpSpPr>
+          <a:xfrm>
+            <a:off x="3429000" y="1828800"/>
+            <a:ext cx="1590261" cy="1143000"/>
+            <a:chOff x="1991139" y="1219200"/>
+            <a:chExt cx="1590261" cy="1143000"/>
+          </a:xfrm>
+        </p:grpSpPr>
+        <p:sp>
+          <p:nvSpPr>
+            <p:cNvPr id="8" name="TextBox 7"/>
+            <p:cNvSpPr txBox="1"/>
+            <p:nvPr/>
+          </p:nvSpPr>
+          <p:spPr>
+            <a:xfrm>
+              <a:off x="1991139" y="1610380"/>
+              <a:ext cx="1590261" cy="523220"/>
+            </a:xfrm>
+            <a:prstGeom prst="rect">
+              <a:avLst/>
+            </a:prstGeom>
+            <a:noFill/>
+          </p:spPr>
+          <p:txBody>
+            <a:bodyPr wrap="square" rtlCol="0">
+              <a:spAutoFit/>
+            </a:bodyPr>
+            <a:lstStyle/>
+            <a:p>
+              <a:pPr algn="ctr"/>
+              <a:r>
+                <a:rPr lang="en-US" sz="1400" dirty="0" smtClean="0"/>
+                <a:t>Selecting</a:t>
+              </a:r>
+              <a:endParaRPr lang="en-US" sz="1400" dirty="0" smtClean="0"/>
+            </a:p>
+            <a:p>
+              <a:pPr algn="ctr"/>
+              <a:r>
+                <a:rPr lang="en-US" sz="1400" dirty="0" smtClean="0"/>
+                <a:t>Process</a:t>
+              </a:r>
+              <a:endParaRPr lang="en-US" sz="1400" dirty="0"/>
+            </a:p>
+          </p:txBody>
+        </p:sp>
+        <p:grpSp>
+          <p:nvGrpSpPr>
+            <p:cNvPr id="12" name="Group 10"/>
+            <p:cNvGrpSpPr/>
+            <p:nvPr/>
+          </p:nvGrpSpPr>
+          <p:grpSpPr>
+            <a:xfrm>
+              <a:off x="2057400" y="1219200"/>
+              <a:ext cx="1371600" cy="1143000"/>
+              <a:chOff x="2057400" y="1219200"/>
+              <a:chExt cx="1371600" cy="1143000"/>
+            </a:xfrm>
+          </p:grpSpPr>
+          <p:sp>
+            <p:nvSpPr>
+              <p:cNvPr id="7" name="Oval 6"/>
+              <p:cNvSpPr/>
+              <p:nvPr/>
+            </p:nvSpPr>
+            <p:spPr>
+              <a:xfrm>
+                <a:off x="2057400" y="1219200"/>
+                <a:ext cx="1371600" cy="1143000"/>
+              </a:xfrm>
+              <a:prstGeom prst="ellipse">
+                <a:avLst/>
+              </a:prstGeom>
+              <a:noFill/>
+              <a:ln>
+                <a:solidFill>
+                  <a:schemeClr val="tx1"/>
+                </a:solidFill>
+              </a:ln>
+            </p:spPr>
+            <p:style>
+              <a:lnRef idx="2">
+                <a:schemeClr val="accent1">
+                  <a:shade val="50000"/>
+                </a:schemeClr>
+              </a:lnRef>
+              <a:fillRef idx="1">
+                <a:schemeClr val="accent1"/>
+              </a:fillRef>
+              <a:effectRef idx="0">
+                <a:schemeClr val="accent1"/>
+              </a:effectRef>
+              <a:fontRef idx="minor">
+                <a:schemeClr val="lt1"/>
+              </a:fontRef>
+            </p:style>
+            <p:txBody>
+              <a:bodyPr rtlCol="0" anchor="ctr"/>
+              <a:lstStyle/>
+              <a:p>
+                <a:pPr algn="ctr"/>
+                <a:endParaRPr lang="en-US"/>
+              </a:p>
+            </p:txBody>
+          </p:sp>
+          <p:sp>
+            <p:nvSpPr>
+              <p:cNvPr id="10" name="TextBox 9"/>
+              <p:cNvSpPr txBox="1"/>
+              <p:nvPr/>
+            </p:nvSpPr>
+            <p:spPr>
+              <a:xfrm>
+                <a:off x="2514600" y="1219200"/>
+                <a:ext cx="476412" cy="369332"/>
+              </a:xfrm>
+              <a:prstGeom prst="rect">
+                <a:avLst/>
+              </a:prstGeom>
+              <a:noFill/>
+            </p:spPr>
+            <p:txBody>
+              <a:bodyPr wrap="none" rtlCol="0">
+                <a:spAutoFit/>
+              </a:bodyPr>
+              <a:lstStyle/>
+              <a:p>
+                <a:r>
+                  <a:rPr lang="en-US" dirty="0" smtClean="0"/>
+                  <a:t>7</a:t>
+                </a:r>
+                <a:r>
+                  <a:rPr lang="en-US" dirty="0" smtClean="0"/>
+                  <a:t>.1</a:t>
+                </a:r>
+                <a:endParaRPr lang="en-US" dirty="0"/>
+              </a:p>
+            </p:txBody>
+          </p:sp>
+        </p:grpSp>
+      </p:grpSp>
+      <p:grpSp>
+        <p:nvGrpSpPr>
+          <p:cNvPr id="13" name="Group 12"/>
+          <p:cNvGrpSpPr/>
+          <p:nvPr/>
+        </p:nvGrpSpPr>
+        <p:grpSpPr>
+          <a:xfrm>
+            <a:off x="6172200" y="1828800"/>
+            <a:ext cx="1590261" cy="1143000"/>
+            <a:chOff x="1991139" y="1219200"/>
+            <a:chExt cx="1590261" cy="1143000"/>
+          </a:xfrm>
+        </p:grpSpPr>
+        <p:sp>
+          <p:nvSpPr>
+            <p:cNvPr id="14" name="TextBox 13"/>
+            <p:cNvSpPr txBox="1"/>
+            <p:nvPr/>
+          </p:nvSpPr>
+          <p:spPr>
+            <a:xfrm>
+              <a:off x="1991139" y="1610380"/>
+              <a:ext cx="1590261" cy="523220"/>
+            </a:xfrm>
+            <a:prstGeom prst="rect">
+              <a:avLst/>
+            </a:prstGeom>
+            <a:noFill/>
+          </p:spPr>
+          <p:txBody>
+            <a:bodyPr wrap="square" rtlCol="0">
+              <a:spAutoFit/>
+            </a:bodyPr>
+            <a:lstStyle/>
+            <a:p>
+              <a:pPr algn="ctr"/>
+              <a:r>
+                <a:rPr lang="en-US" sz="1400" dirty="0" smtClean="0"/>
+                <a:t>Verify Selection</a:t>
+              </a:r>
+              <a:endParaRPr lang="en-US" sz="1400" dirty="0" smtClean="0"/>
+            </a:p>
+            <a:p>
+              <a:pPr algn="ctr"/>
+              <a:r>
+                <a:rPr lang="en-US" sz="1400" dirty="0" smtClean="0"/>
+                <a:t>Process</a:t>
+              </a:r>
+              <a:endParaRPr lang="en-US" sz="1400" dirty="0"/>
+            </a:p>
+          </p:txBody>
+        </p:sp>
+        <p:grpSp>
+          <p:nvGrpSpPr>
+            <p:cNvPr id="15" name="Group 10"/>
+            <p:cNvGrpSpPr/>
+            <p:nvPr/>
+          </p:nvGrpSpPr>
+          <p:grpSpPr>
+            <a:xfrm>
+              <a:off x="2057400" y="1219200"/>
+              <a:ext cx="1371600" cy="1143000"/>
+              <a:chOff x="2057400" y="1219200"/>
+              <a:chExt cx="1371600" cy="1143000"/>
+            </a:xfrm>
+          </p:grpSpPr>
+          <p:sp>
+            <p:nvSpPr>
+              <p:cNvPr id="16" name="Oval 15"/>
+              <p:cNvSpPr/>
+              <p:nvPr/>
+            </p:nvSpPr>
+            <p:spPr>
+              <a:xfrm>
+                <a:off x="2057400" y="1219200"/>
+                <a:ext cx="1371600" cy="1143000"/>
+              </a:xfrm>
+              <a:prstGeom prst="ellipse">
+                <a:avLst/>
+              </a:prstGeom>
+              <a:noFill/>
+              <a:ln>
+                <a:solidFill>
+                  <a:schemeClr val="tx1"/>
+                </a:solidFill>
+              </a:ln>
+            </p:spPr>
+            <p:style>
+              <a:lnRef idx="2">
+                <a:schemeClr val="accent1">
+                  <a:shade val="50000"/>
+                </a:schemeClr>
+              </a:lnRef>
+              <a:fillRef idx="1">
+                <a:schemeClr val="accent1"/>
+              </a:fillRef>
+              <a:effectRef idx="0">
+                <a:schemeClr val="accent1"/>
+              </a:effectRef>
+              <a:fontRef idx="minor">
+                <a:schemeClr val="lt1"/>
+              </a:fontRef>
+            </p:style>
+            <p:txBody>
+              <a:bodyPr rtlCol="0" anchor="ctr"/>
+              <a:lstStyle/>
+              <a:p>
+                <a:pPr algn="ctr"/>
+                <a:endParaRPr lang="en-US"/>
+              </a:p>
+            </p:txBody>
+          </p:sp>
+          <p:sp>
+            <p:nvSpPr>
+              <p:cNvPr id="17" name="TextBox 16"/>
+              <p:cNvSpPr txBox="1"/>
+              <p:nvPr/>
+            </p:nvSpPr>
+            <p:spPr>
+              <a:xfrm>
+                <a:off x="2514600" y="1219200"/>
+                <a:ext cx="476412" cy="369332"/>
+              </a:xfrm>
+              <a:prstGeom prst="rect">
+                <a:avLst/>
+              </a:prstGeom>
+              <a:noFill/>
+            </p:spPr>
+            <p:txBody>
+              <a:bodyPr wrap="none" rtlCol="0">
+                <a:spAutoFit/>
+              </a:bodyPr>
+              <a:lstStyle/>
+              <a:p>
+                <a:r>
+                  <a:rPr lang="en-US" dirty="0" smtClean="0"/>
+                  <a:t>7</a:t>
+                </a:r>
+                <a:r>
+                  <a:rPr lang="en-US" dirty="0" smtClean="0"/>
+                  <a:t>.2</a:t>
+                </a:r>
+                <a:endParaRPr lang="en-US" dirty="0"/>
+              </a:p>
+            </p:txBody>
+          </p:sp>
+        </p:grpSp>
+      </p:grpSp>
+      <p:grpSp>
+        <p:nvGrpSpPr>
+          <p:cNvPr id="18" name="Group 17"/>
+          <p:cNvGrpSpPr/>
+          <p:nvPr/>
+        </p:nvGrpSpPr>
+        <p:grpSpPr>
+          <a:xfrm>
+            <a:off x="914400" y="4953000"/>
+            <a:ext cx="1590261" cy="1143000"/>
+            <a:chOff x="1991139" y="1219200"/>
+            <a:chExt cx="1590261" cy="1143000"/>
+          </a:xfrm>
+        </p:grpSpPr>
+        <p:sp>
+          <p:nvSpPr>
+            <p:cNvPr id="19" name="TextBox 18"/>
+            <p:cNvSpPr txBox="1"/>
+            <p:nvPr/>
+          </p:nvSpPr>
+          <p:spPr>
+            <a:xfrm>
+              <a:off x="1991139" y="1610380"/>
+              <a:ext cx="1590261" cy="523220"/>
+            </a:xfrm>
+            <a:prstGeom prst="rect">
+              <a:avLst/>
+            </a:prstGeom>
+            <a:noFill/>
+          </p:spPr>
+          <p:txBody>
+            <a:bodyPr wrap="square" rtlCol="0">
+              <a:spAutoFit/>
+            </a:bodyPr>
+            <a:lstStyle/>
+            <a:p>
+              <a:pPr algn="ctr"/>
+              <a:r>
+                <a:rPr lang="en-US" sz="1400" dirty="0" smtClean="0"/>
+                <a:t>Compose Note</a:t>
+              </a:r>
+              <a:endParaRPr lang="en-US" sz="1400" dirty="0" smtClean="0"/>
+            </a:p>
+            <a:p>
+              <a:pPr algn="ctr"/>
+              <a:r>
+                <a:rPr lang="en-US" sz="1400" dirty="0" smtClean="0"/>
+                <a:t>Process</a:t>
+              </a:r>
+              <a:endParaRPr lang="en-US" sz="1400" dirty="0"/>
+            </a:p>
+          </p:txBody>
+        </p:sp>
+        <p:grpSp>
+          <p:nvGrpSpPr>
+            <p:cNvPr id="20" name="Group 10"/>
+            <p:cNvGrpSpPr/>
+            <p:nvPr/>
+          </p:nvGrpSpPr>
+          <p:grpSpPr>
+            <a:xfrm>
+              <a:off x="2057400" y="1219200"/>
+              <a:ext cx="1371600" cy="1143000"/>
+              <a:chOff x="2057400" y="1219200"/>
+              <a:chExt cx="1371600" cy="1143000"/>
+            </a:xfrm>
+          </p:grpSpPr>
+          <p:sp>
+            <p:nvSpPr>
+              <p:cNvPr id="21" name="Oval 20"/>
+              <p:cNvSpPr/>
+              <p:nvPr/>
+            </p:nvSpPr>
+            <p:spPr>
+              <a:xfrm>
+                <a:off x="2057400" y="1219200"/>
+                <a:ext cx="1371600" cy="1143000"/>
+              </a:xfrm>
+              <a:prstGeom prst="ellipse">
+                <a:avLst/>
+              </a:prstGeom>
+              <a:noFill/>
+              <a:ln>
+                <a:solidFill>
+                  <a:schemeClr val="tx1"/>
+                </a:solidFill>
+              </a:ln>
+            </p:spPr>
+            <p:style>
+              <a:lnRef idx="2">
+                <a:schemeClr val="accent1">
+                  <a:shade val="50000"/>
+                </a:schemeClr>
+              </a:lnRef>
+              <a:fillRef idx="1">
+                <a:schemeClr val="accent1"/>
+              </a:fillRef>
+              <a:effectRef idx="0">
+                <a:schemeClr val="accent1"/>
+              </a:effectRef>
+              <a:fontRef idx="minor">
+                <a:schemeClr val="lt1"/>
+              </a:fontRef>
+            </p:style>
+            <p:txBody>
+              <a:bodyPr rtlCol="0" anchor="ctr"/>
+              <a:lstStyle/>
+              <a:p>
+                <a:pPr algn="ctr"/>
+                <a:endParaRPr lang="en-US"/>
+              </a:p>
+            </p:txBody>
+          </p:sp>
+          <p:sp>
+            <p:nvSpPr>
+              <p:cNvPr id="22" name="TextBox 21"/>
+              <p:cNvSpPr txBox="1"/>
+              <p:nvPr/>
+            </p:nvSpPr>
+            <p:spPr>
+              <a:xfrm>
+                <a:off x="2514600" y="1219200"/>
+                <a:ext cx="476412" cy="369332"/>
+              </a:xfrm>
+              <a:prstGeom prst="rect">
+                <a:avLst/>
+              </a:prstGeom>
+              <a:noFill/>
+            </p:spPr>
+            <p:txBody>
+              <a:bodyPr wrap="none" rtlCol="0">
+                <a:spAutoFit/>
+              </a:bodyPr>
+              <a:lstStyle/>
+              <a:p>
+                <a:r>
+                  <a:rPr lang="en-US" dirty="0" smtClean="0"/>
+                  <a:t>7</a:t>
+                </a:r>
+                <a:r>
+                  <a:rPr lang="en-US" dirty="0" smtClean="0"/>
+                  <a:t>.3</a:t>
+                </a:r>
+                <a:endParaRPr lang="en-US" dirty="0"/>
+              </a:p>
+            </p:txBody>
+          </p:sp>
+        </p:grpSp>
+      </p:grpSp>
+      <p:grpSp>
+        <p:nvGrpSpPr>
+          <p:cNvPr id="23" name="Group 62"/>
+          <p:cNvGrpSpPr/>
+          <p:nvPr/>
+        </p:nvGrpSpPr>
+        <p:grpSpPr>
+          <a:xfrm>
+            <a:off x="2590800" y="4038600"/>
+            <a:ext cx="1676400" cy="457200"/>
+            <a:chOff x="304800" y="1676400"/>
+            <a:chExt cx="1676400" cy="457200"/>
+          </a:xfrm>
+        </p:grpSpPr>
+        <p:sp>
+          <p:nvSpPr>
+            <p:cNvPr id="24" name="Rectangle 23"/>
+            <p:cNvSpPr/>
+            <p:nvPr/>
+          </p:nvSpPr>
+          <p:spPr>
+            <a:xfrm>
+              <a:off x="304800" y="1676400"/>
+              <a:ext cx="1676400" cy="457200"/>
+            </a:xfrm>
+            <a:prstGeom prst="rect">
+              <a:avLst/>
+            </a:prstGeom>
+            <a:noFill/>
+            <a:ln>
+              <a:solidFill>
+                <a:schemeClr val="tx1"/>
+              </a:solidFill>
+            </a:ln>
+          </p:spPr>
+          <p:style>
+            <a:lnRef idx="2">
+              <a:schemeClr val="accent1">
+                <a:shade val="50000"/>
+              </a:schemeClr>
+            </a:lnRef>
+            <a:fillRef idx="1">
+              <a:schemeClr val="accent1"/>
+            </a:fillRef>
+            <a:effectRef idx="0">
+              <a:schemeClr val="accent1"/>
+            </a:effectRef>
+            <a:fontRef idx="minor">
+              <a:schemeClr val="lt1"/>
+            </a:fontRef>
+          </p:style>
+          <p:txBody>
+            <a:bodyPr rtlCol="0" anchor="ctr"/>
+            <a:lstStyle/>
+            <a:p>
+              <a:pPr algn="ctr"/>
+              <a:endParaRPr lang="en-US"/>
+            </a:p>
+          </p:txBody>
+        </p:sp>
+        <p:sp>
+          <p:nvSpPr>
+            <p:cNvPr id="25" name="TextBox 24"/>
+            <p:cNvSpPr txBox="1"/>
+            <p:nvPr/>
+          </p:nvSpPr>
+          <p:spPr>
+            <a:xfrm>
+              <a:off x="762000" y="1752600"/>
+              <a:ext cx="1082091" cy="307777"/>
+            </a:xfrm>
+            <a:prstGeom prst="rect">
+              <a:avLst/>
+            </a:prstGeom>
+            <a:noFill/>
+          </p:spPr>
+          <p:txBody>
+            <a:bodyPr wrap="none" rtlCol="0">
+              <a:spAutoFit/>
+            </a:bodyPr>
+            <a:lstStyle/>
+            <a:p>
+              <a:r>
+                <a:rPr lang="en-US" sz="1400" dirty="0" smtClean="0"/>
+                <a:t>Note </a:t>
+              </a:r>
+              <a:r>
+                <a:rPr lang="en-US" sz="1400" dirty="0" smtClean="0"/>
+                <a:t>Details</a:t>
+              </a:r>
+              <a:endParaRPr lang="en-US" sz="1400" dirty="0" smtClean="0"/>
+            </a:p>
+          </p:txBody>
+        </p:sp>
+        <p:cxnSp>
+          <p:nvCxnSpPr>
+            <p:cNvPr id="26" name="Straight Connector 25"/>
+            <p:cNvCxnSpPr/>
+            <p:nvPr/>
+          </p:nvCxnSpPr>
+          <p:spPr>
+            <a:xfrm rot="5400000">
+              <a:off x="457994" y="1904206"/>
+              <a:ext cx="456406" cy="794"/>
+            </a:xfrm>
+            <a:prstGeom prst="line">
+              <a:avLst/>
+            </a:prstGeom>
+            <a:ln>
+              <a:solidFill>
+                <a:schemeClr val="tx1"/>
+              </a:solidFill>
+            </a:ln>
+          </p:spPr>
+          <p:style>
+            <a:lnRef idx="1">
+              <a:schemeClr val="accent1"/>
+            </a:lnRef>
+            <a:fillRef idx="0">
+              <a:schemeClr val="accent1"/>
+            </a:fillRef>
+            <a:effectRef idx="0">
+              <a:schemeClr val="accent1"/>
+            </a:effectRef>
+            <a:fontRef idx="minor">
+              <a:schemeClr val="tx1"/>
+            </a:fontRef>
+          </p:style>
+        </p:cxnSp>
+        <p:sp>
+          <p:nvSpPr>
+            <p:cNvPr id="27" name="TextBox 26"/>
+            <p:cNvSpPr txBox="1"/>
+            <p:nvPr/>
+          </p:nvSpPr>
+          <p:spPr>
+            <a:xfrm>
+              <a:off x="304800" y="1752600"/>
+              <a:ext cx="386644" cy="307777"/>
+            </a:xfrm>
+            <a:prstGeom prst="rect">
+              <a:avLst/>
+            </a:prstGeom>
+            <a:noFill/>
+          </p:spPr>
+          <p:txBody>
+            <a:bodyPr wrap="none" rtlCol="0">
+              <a:spAutoFit/>
+            </a:bodyPr>
+            <a:lstStyle/>
+            <a:p>
+              <a:r>
+                <a:rPr lang="en-US" sz="1400" dirty="0" smtClean="0"/>
+                <a:t>D4</a:t>
+              </a:r>
+              <a:endParaRPr lang="en-US" sz="1400" dirty="0"/>
+            </a:p>
+          </p:txBody>
+        </p:sp>
+      </p:grpSp>
+      <p:cxnSp>
+        <p:nvCxnSpPr>
+          <p:cNvPr id="29" name="Elbow Connector 28"/>
+          <p:cNvCxnSpPr>
+            <a:stCxn id="6" idx="2"/>
+            <a:endCxn id="22" idx="0"/>
+          </p:cNvCxnSpPr>
+          <p:nvPr/>
+        </p:nvCxnSpPr>
+        <p:spPr>
+          <a:xfrm rot="5400000">
+            <a:off x="-166" y="3276434"/>
+            <a:ext cx="3352800" cy="333"/>
+          </a:xfrm>
+          <a:prstGeom prst="bentConnector3">
+            <a:avLst>
+              <a:gd name="adj1" fmla="val 50000"/>
+            </a:avLst>
+          </a:prstGeom>
+          <a:ln>
+            <a:solidFill>
+              <a:schemeClr val="tx1"/>
+            </a:solidFill>
+            <a:tailEnd type="arrow"/>
+          </a:ln>
+        </p:spPr>
+        <p:style>
+          <a:lnRef idx="1">
+            <a:schemeClr val="accent1"/>
+          </a:lnRef>
+          <a:fillRef idx="0">
+            <a:schemeClr val="accent1"/>
+          </a:fillRef>
+          <a:effectRef idx="0">
+            <a:schemeClr val="accent1"/>
+          </a:effectRef>
+          <a:fontRef idx="minor">
+            <a:schemeClr val="tx1"/>
+          </a:fontRef>
+        </p:style>
+      </p:cxnSp>
+      <p:cxnSp>
+        <p:nvCxnSpPr>
+          <p:cNvPr id="31" name="Elbow Connector 30"/>
+          <p:cNvCxnSpPr>
+            <a:stCxn id="21" idx="2"/>
+            <a:endCxn id="6" idx="1"/>
+          </p:cNvCxnSpPr>
+          <p:nvPr/>
+        </p:nvCxnSpPr>
+        <p:spPr>
+          <a:xfrm rot="10800000" flipH="1">
+            <a:off x="980660" y="1409700"/>
+            <a:ext cx="162339" cy="4114800"/>
+          </a:xfrm>
+          <a:prstGeom prst="bentConnector3">
+            <a:avLst>
+              <a:gd name="adj1" fmla="val -140816"/>
+            </a:avLst>
+          </a:prstGeom>
+          <a:ln>
+            <a:solidFill>
+              <a:schemeClr val="tx1"/>
+            </a:solidFill>
+            <a:tailEnd type="arrow"/>
+          </a:ln>
+        </p:spPr>
+        <p:style>
+          <a:lnRef idx="1">
+            <a:schemeClr val="accent1"/>
+          </a:lnRef>
+          <a:fillRef idx="0">
+            <a:schemeClr val="accent1"/>
+          </a:fillRef>
+          <a:effectRef idx="0">
+            <a:schemeClr val="accent1"/>
+          </a:effectRef>
+          <a:fontRef idx="minor">
+            <a:schemeClr val="tx1"/>
+          </a:fontRef>
+        </p:style>
+      </p:cxnSp>
+      <p:cxnSp>
+        <p:nvCxnSpPr>
+          <p:cNvPr id="33" name="Shape 32"/>
+          <p:cNvCxnSpPr>
+            <a:stCxn id="21" idx="6"/>
+            <a:endCxn id="24" idx="2"/>
+          </p:cNvCxnSpPr>
+          <p:nvPr/>
+        </p:nvCxnSpPr>
+        <p:spPr>
+          <a:xfrm flipV="1">
+            <a:off x="2352261" y="4495800"/>
+            <a:ext cx="1076739" cy="1028700"/>
+          </a:xfrm>
+          <a:prstGeom prst="bentConnector2">
+            <a:avLst/>
+          </a:prstGeom>
+          <a:ln>
+            <a:solidFill>
+              <a:schemeClr val="tx1"/>
+            </a:solidFill>
+            <a:tailEnd type="arrow"/>
+          </a:ln>
+        </p:spPr>
+        <p:style>
+          <a:lnRef idx="1">
+            <a:schemeClr val="accent1"/>
+          </a:lnRef>
+          <a:fillRef idx="0">
+            <a:schemeClr val="accent1"/>
+          </a:fillRef>
+          <a:effectRef idx="0">
+            <a:schemeClr val="accent1"/>
+          </a:effectRef>
+          <a:fontRef idx="minor">
+            <a:schemeClr val="tx1"/>
+          </a:fontRef>
+        </p:style>
+      </p:cxnSp>
+      <p:cxnSp>
+        <p:nvCxnSpPr>
+          <p:cNvPr id="35" name="Elbow Connector 34"/>
+          <p:cNvCxnSpPr>
+            <a:stCxn id="6" idx="0"/>
+            <a:endCxn id="10" idx="0"/>
+          </p:cNvCxnSpPr>
+          <p:nvPr/>
+        </p:nvCxnSpPr>
+        <p:spPr>
+          <a:xfrm rot="16200000" flipH="1">
+            <a:off x="2628733" y="266867"/>
+            <a:ext cx="609600" cy="2514267"/>
+          </a:xfrm>
+          <a:prstGeom prst="bentConnector3">
+            <a:avLst>
+              <a:gd name="adj1" fmla="val -37500"/>
+            </a:avLst>
+          </a:prstGeom>
+          <a:ln>
+            <a:solidFill>
+              <a:schemeClr val="tx1"/>
+            </a:solidFill>
+            <a:tailEnd type="arrow"/>
+          </a:ln>
+        </p:spPr>
+        <p:style>
+          <a:lnRef idx="1">
+            <a:schemeClr val="accent1"/>
+          </a:lnRef>
+          <a:fillRef idx="0">
+            <a:schemeClr val="accent1"/>
+          </a:fillRef>
+          <a:effectRef idx="0">
+            <a:schemeClr val="accent1"/>
+          </a:effectRef>
+          <a:fontRef idx="minor">
+            <a:schemeClr val="tx1"/>
+          </a:fontRef>
+        </p:style>
+      </p:cxnSp>
+      <p:cxnSp>
+        <p:nvCxnSpPr>
+          <p:cNvPr id="37" name="Elbow Connector 36"/>
+          <p:cNvCxnSpPr>
+            <a:stCxn id="7" idx="2"/>
+            <a:endCxn id="6" idx="3"/>
+          </p:cNvCxnSpPr>
+          <p:nvPr/>
+        </p:nvCxnSpPr>
+        <p:spPr>
+          <a:xfrm rot="10800000">
+            <a:off x="2209801" y="1409700"/>
+            <a:ext cx="1285461" cy="990600"/>
+          </a:xfrm>
+          <a:prstGeom prst="bentConnector3">
+            <a:avLst>
+              <a:gd name="adj1" fmla="val 50000"/>
+            </a:avLst>
+          </a:prstGeom>
+          <a:ln>
+            <a:solidFill>
+              <a:schemeClr val="tx1"/>
+            </a:solidFill>
+            <a:tailEnd type="arrow"/>
+          </a:ln>
+        </p:spPr>
+        <p:style>
+          <a:lnRef idx="1">
+            <a:schemeClr val="accent1"/>
+          </a:lnRef>
+          <a:fillRef idx="0">
+            <a:schemeClr val="accent1"/>
+          </a:fillRef>
+          <a:effectRef idx="0">
+            <a:schemeClr val="accent1"/>
+          </a:effectRef>
+          <a:fontRef idx="minor">
+            <a:schemeClr val="tx1"/>
+          </a:fontRef>
+        </p:style>
+      </p:cxnSp>
+      <p:cxnSp>
+        <p:nvCxnSpPr>
+          <p:cNvPr id="39" name="Shape 38"/>
+          <p:cNvCxnSpPr>
+            <a:stCxn id="7" idx="7"/>
+            <a:endCxn id="17" idx="0"/>
+          </p:cNvCxnSpPr>
+          <p:nvPr/>
+        </p:nvCxnSpPr>
+        <p:spPr>
+          <a:xfrm rot="5400000" flipH="1" flipV="1">
+            <a:off x="5716237" y="778558"/>
+            <a:ext cx="167388" cy="2267872"/>
+          </a:xfrm>
+          <a:prstGeom prst="bentConnector3">
+            <a:avLst>
+              <a:gd name="adj1" fmla="val 236569"/>
+            </a:avLst>
+          </a:prstGeom>
+          <a:ln>
+            <a:solidFill>
+              <a:schemeClr val="tx1"/>
+            </a:solidFill>
+            <a:tailEnd type="arrow"/>
+          </a:ln>
+        </p:spPr>
+        <p:style>
+          <a:lnRef idx="1">
+            <a:schemeClr val="accent1"/>
+          </a:lnRef>
+          <a:fillRef idx="0">
+            <a:schemeClr val="accent1"/>
+          </a:fillRef>
+          <a:effectRef idx="0">
+            <a:schemeClr val="accent1"/>
+          </a:effectRef>
+          <a:fontRef idx="minor">
+            <a:schemeClr val="tx1"/>
+          </a:fontRef>
+        </p:style>
+      </p:cxnSp>
+      <p:cxnSp>
+        <p:nvCxnSpPr>
+          <p:cNvPr id="43" name="Shape 42"/>
+          <p:cNvCxnSpPr>
+            <a:stCxn id="16" idx="4"/>
+            <a:endCxn id="2" idx="6"/>
+          </p:cNvCxnSpPr>
+          <p:nvPr/>
+        </p:nvCxnSpPr>
+        <p:spPr>
+          <a:xfrm rot="5400000">
+            <a:off x="5710031" y="3967370"/>
+            <a:ext cx="2209800" cy="218661"/>
+          </a:xfrm>
+          <a:prstGeom prst="bentConnector2">
+            <a:avLst/>
+          </a:prstGeom>
+          <a:ln>
+            <a:solidFill>
+              <a:schemeClr val="tx1"/>
+            </a:solidFill>
+            <a:tailEnd type="arrow"/>
+          </a:ln>
+        </p:spPr>
+        <p:style>
+          <a:lnRef idx="1">
+            <a:schemeClr val="accent1"/>
+          </a:lnRef>
+          <a:fillRef idx="0">
+            <a:schemeClr val="accent1"/>
+          </a:fillRef>
+          <a:effectRef idx="0">
+            <a:schemeClr val="accent1"/>
+          </a:effectRef>
+          <a:fontRef idx="minor">
+            <a:schemeClr val="tx1"/>
+          </a:fontRef>
+        </p:style>
+      </p:cxnSp>
+      <p:cxnSp>
+        <p:nvCxnSpPr>
+          <p:cNvPr id="45" name="Elbow Connector 44"/>
+          <p:cNvCxnSpPr>
+            <a:stCxn id="2" idx="7"/>
+            <a:endCxn id="16" idx="3"/>
+          </p:cNvCxnSpPr>
+          <p:nvPr/>
+        </p:nvCxnSpPr>
+        <p:spPr>
+          <a:xfrm rot="5400000" flipH="1" flipV="1">
+            <a:off x="5465484" y="3776706"/>
+            <a:ext cx="1946136" cy="1549"/>
+          </a:xfrm>
+          <a:prstGeom prst="bentConnector3">
+            <a:avLst>
+              <a:gd name="adj1" fmla="val 50000"/>
+            </a:avLst>
+          </a:prstGeom>
+          <a:ln>
+            <a:solidFill>
+              <a:schemeClr val="tx1"/>
+            </a:solidFill>
+            <a:tailEnd type="arrow"/>
+          </a:ln>
+        </p:spPr>
+        <p:style>
+          <a:lnRef idx="1">
+            <a:schemeClr val="accent1"/>
+          </a:lnRef>
+          <a:fillRef idx="0">
+            <a:schemeClr val="accent1"/>
+          </a:fillRef>
+          <a:effectRef idx="0">
+            <a:schemeClr val="accent1"/>
+          </a:effectRef>
+          <a:fontRef idx="minor">
+            <a:schemeClr val="tx1"/>
+          </a:fontRef>
+        </p:style>
+      </p:cxnSp>
+      <p:cxnSp>
+        <p:nvCxnSpPr>
+          <p:cNvPr id="51" name="Elbow Connector 50"/>
+          <p:cNvCxnSpPr/>
+          <p:nvPr/>
+        </p:nvCxnSpPr>
+        <p:spPr>
+          <a:xfrm rot="5400000" flipH="1" flipV="1">
+            <a:off x="3505200" y="3505200"/>
+            <a:ext cx="1066800" cy="1588"/>
+          </a:xfrm>
+          <a:prstGeom prst="bentConnector3">
+            <a:avLst>
+              <a:gd name="adj1" fmla="val 50000"/>
+            </a:avLst>
+          </a:prstGeom>
+          <a:ln>
+            <a:solidFill>
+              <a:schemeClr val="tx1"/>
+            </a:solidFill>
+            <a:tailEnd type="arrow"/>
+          </a:ln>
+        </p:spPr>
+        <p:style>
+          <a:lnRef idx="1">
+            <a:schemeClr val="accent1"/>
+          </a:lnRef>
+          <a:fillRef idx="0">
+            <a:schemeClr val="accent1"/>
+          </a:fillRef>
+          <a:effectRef idx="0">
+            <a:schemeClr val="accent1"/>
+          </a:effectRef>
+          <a:fontRef idx="minor">
+            <a:schemeClr val="tx1"/>
+          </a:fontRef>
+        </p:style>
+      </p:cxnSp>
+      <p:sp>
+        <p:nvSpPr>
+          <p:cNvPr id="52" name="TextBox 51"/>
+          <p:cNvSpPr txBox="1"/>
+          <p:nvPr/>
+        </p:nvSpPr>
+        <p:spPr>
+          <a:xfrm>
+            <a:off x="2362200" y="5257800"/>
+            <a:ext cx="1122167" cy="307777"/>
+          </a:xfrm>
+          <a:prstGeom prst="rect">
+            <a:avLst/>
+          </a:prstGeom>
+          <a:noFill/>
+        </p:spPr>
+        <p:txBody>
+          <a:bodyPr wrap="none" rtlCol="0">
+            <a:spAutoFit/>
+          </a:bodyPr>
+          <a:lstStyle/>
+          <a:p>
+            <a:r>
+              <a:rPr lang="en-US" sz="1400" dirty="0" smtClean="0"/>
+              <a:t>Note Details </a:t>
+            </a:r>
+            <a:endParaRPr lang="en-US" sz="1400" dirty="0"/>
+          </a:p>
+        </p:txBody>
+      </p:sp>
+      <p:sp>
+        <p:nvSpPr>
+          <p:cNvPr id="53" name="TextBox 52"/>
+          <p:cNvSpPr txBox="1"/>
+          <p:nvPr/>
+        </p:nvSpPr>
+        <p:spPr>
+          <a:xfrm rot="16200000">
+            <a:off x="3326605" y="3302795"/>
+            <a:ext cx="1122167" cy="307777"/>
+          </a:xfrm>
+          <a:prstGeom prst="rect">
+            <a:avLst/>
+          </a:prstGeom>
+          <a:noFill/>
+        </p:spPr>
+        <p:txBody>
+          <a:bodyPr wrap="none" rtlCol="0">
+            <a:spAutoFit/>
+          </a:bodyPr>
+          <a:lstStyle/>
+          <a:p>
+            <a:r>
+              <a:rPr lang="en-US" sz="1400" dirty="0" smtClean="0"/>
+              <a:t>Note Details </a:t>
+            </a:r>
+            <a:endParaRPr lang="en-US" sz="1400" dirty="0"/>
+          </a:p>
+        </p:txBody>
+      </p:sp>
+      <p:sp>
+        <p:nvSpPr>
+          <p:cNvPr id="54" name="TextBox 53"/>
+          <p:cNvSpPr txBox="1"/>
+          <p:nvPr/>
+        </p:nvSpPr>
+        <p:spPr>
+          <a:xfrm rot="16200000">
+            <a:off x="926165" y="3248608"/>
+            <a:ext cx="1808252" cy="307777"/>
+          </a:xfrm>
+          <a:prstGeom prst="rect">
+            <a:avLst/>
+          </a:prstGeom>
+          <a:noFill/>
+        </p:spPr>
+        <p:txBody>
+          <a:bodyPr wrap="none" rtlCol="0">
+            <a:spAutoFit/>
+          </a:bodyPr>
+          <a:lstStyle/>
+          <a:p>
+            <a:r>
+              <a:rPr lang="en-US" sz="1400" dirty="0" smtClean="0"/>
+              <a:t>Compose note details </a:t>
+            </a:r>
+            <a:endParaRPr lang="en-US" sz="1400" dirty="0"/>
+          </a:p>
+        </p:txBody>
+      </p:sp>
+      <p:sp>
+        <p:nvSpPr>
+          <p:cNvPr id="55" name="TextBox 54"/>
+          <p:cNvSpPr txBox="1"/>
+          <p:nvPr/>
+        </p:nvSpPr>
+        <p:spPr>
+          <a:xfrm rot="16200000">
+            <a:off x="64279" y="3272293"/>
+            <a:ext cx="1703223" cy="307777"/>
+          </a:xfrm>
+          <a:prstGeom prst="rect">
+            <a:avLst/>
+          </a:prstGeom>
+          <a:noFill/>
+        </p:spPr>
+        <p:txBody>
+          <a:bodyPr wrap="none" rtlCol="0">
+            <a:spAutoFit/>
+          </a:bodyPr>
+          <a:lstStyle/>
+          <a:p>
+            <a:r>
+              <a:rPr lang="en-US" sz="1400" dirty="0" smtClean="0"/>
+              <a:t>Compose note result</a:t>
+            </a:r>
+            <a:endParaRPr lang="en-US" sz="1400" dirty="0"/>
+          </a:p>
+        </p:txBody>
+      </p:sp>
+      <p:sp>
+        <p:nvSpPr>
+          <p:cNvPr id="56" name="TextBox 55"/>
+          <p:cNvSpPr txBox="1"/>
+          <p:nvPr/>
+        </p:nvSpPr>
+        <p:spPr>
+          <a:xfrm>
+            <a:off x="2362200" y="685800"/>
+            <a:ext cx="1209947" cy="307777"/>
+          </a:xfrm>
+          <a:prstGeom prst="rect">
+            <a:avLst/>
+          </a:prstGeom>
+          <a:noFill/>
+        </p:spPr>
+        <p:txBody>
+          <a:bodyPr wrap="none" rtlCol="0">
+            <a:spAutoFit/>
+          </a:bodyPr>
+          <a:lstStyle/>
+          <a:p>
+            <a:r>
+              <a:rPr lang="en-US" sz="1400" dirty="0" smtClean="0"/>
+              <a:t>Selecting data</a:t>
+            </a:r>
+            <a:endParaRPr lang="en-US" sz="1400" dirty="0"/>
+          </a:p>
+        </p:txBody>
+      </p:sp>
+      <p:sp>
+        <p:nvSpPr>
+          <p:cNvPr id="57" name="TextBox 56"/>
+          <p:cNvSpPr txBox="1"/>
+          <p:nvPr/>
+        </p:nvSpPr>
+        <p:spPr>
+          <a:xfrm rot="16200000">
+            <a:off x="2456545" y="1658255"/>
+            <a:ext cx="1033488" cy="307777"/>
+          </a:xfrm>
+          <a:prstGeom prst="rect">
+            <a:avLst/>
+          </a:prstGeom>
+          <a:noFill/>
+        </p:spPr>
+        <p:txBody>
+          <a:bodyPr wrap="none" rtlCol="0">
+            <a:spAutoFit/>
+          </a:bodyPr>
+          <a:lstStyle/>
+          <a:p>
+            <a:r>
+              <a:rPr lang="en-US" sz="1400" dirty="0" smtClean="0"/>
+              <a:t>Login result</a:t>
+            </a:r>
+            <a:endParaRPr lang="en-US" sz="1400" dirty="0"/>
+          </a:p>
+        </p:txBody>
+      </p:sp>
+      <p:sp>
+        <p:nvSpPr>
+          <p:cNvPr id="58" name="TextBox 57"/>
+          <p:cNvSpPr txBox="1"/>
+          <p:nvPr/>
+        </p:nvSpPr>
+        <p:spPr>
+          <a:xfrm rot="16200000">
+            <a:off x="6196627" y="3833836"/>
+            <a:ext cx="1782924" cy="307777"/>
+          </a:xfrm>
+          <a:prstGeom prst="rect">
+            <a:avLst/>
+          </a:prstGeom>
+          <a:noFill/>
+        </p:spPr>
+        <p:txBody>
+          <a:bodyPr wrap="none" rtlCol="0">
+            <a:spAutoFit/>
+          </a:bodyPr>
+          <a:lstStyle/>
+          <a:p>
+            <a:r>
+              <a:rPr lang="en-US" sz="1400" dirty="0" smtClean="0"/>
+              <a:t>Selection Details </a:t>
+            </a:r>
+            <a:r>
+              <a:rPr lang="en-US" sz="1400" dirty="0" smtClean="0"/>
+              <a:t>info </a:t>
+            </a:r>
+            <a:endParaRPr lang="en-US" sz="1400" dirty="0"/>
+          </a:p>
+        </p:txBody>
+      </p:sp>
+      <p:sp>
+        <p:nvSpPr>
+          <p:cNvPr id="59" name="TextBox 58"/>
+          <p:cNvSpPr txBox="1"/>
+          <p:nvPr/>
+        </p:nvSpPr>
+        <p:spPr>
+          <a:xfrm rot="16200000">
+            <a:off x="5251859" y="3511142"/>
+            <a:ext cx="1996059" cy="307777"/>
+          </a:xfrm>
+          <a:prstGeom prst="rect">
+            <a:avLst/>
+          </a:prstGeom>
+          <a:noFill/>
+        </p:spPr>
+        <p:txBody>
+          <a:bodyPr wrap="none" rtlCol="0">
+            <a:spAutoFit/>
+          </a:bodyPr>
+          <a:lstStyle/>
+          <a:p>
+            <a:r>
+              <a:rPr lang="en-US" sz="1400" dirty="0" smtClean="0"/>
+              <a:t>User authentication info </a:t>
+            </a:r>
+            <a:endParaRPr lang="en-US" sz="1400" dirty="0"/>
+          </a:p>
+        </p:txBody>
+      </p:sp>
+      <p:sp>
+        <p:nvSpPr>
+          <p:cNvPr id="60" name="TextBox 59"/>
+          <p:cNvSpPr txBox="1"/>
+          <p:nvPr/>
+        </p:nvSpPr>
+        <p:spPr>
+          <a:xfrm>
+            <a:off x="5257800" y="1295400"/>
+            <a:ext cx="1175322" cy="307777"/>
+          </a:xfrm>
+          <a:prstGeom prst="rect">
+            <a:avLst/>
+          </a:prstGeom>
+          <a:noFill/>
+        </p:spPr>
+        <p:txBody>
+          <a:bodyPr wrap="none" rtlCol="0">
+            <a:spAutoFit/>
+          </a:bodyPr>
+          <a:lstStyle/>
+          <a:p>
+            <a:r>
+              <a:rPr lang="en-US" sz="1400" dirty="0" smtClean="0"/>
+              <a:t>Selection info</a:t>
+            </a:r>
+            <a:endParaRPr lang="en-US" sz="1400" dirty="0"/>
+          </a:p>
+        </p:txBody>
+      </p:sp>
+      <p:cxnSp>
+        <p:nvCxnSpPr>
+          <p:cNvPr id="64" name="Shape 63"/>
+          <p:cNvCxnSpPr/>
+          <p:nvPr/>
+        </p:nvCxnSpPr>
+        <p:spPr>
+          <a:xfrm rot="10800000">
+            <a:off x="4800600" y="2667000"/>
+            <a:ext cx="1524002" cy="1588"/>
+          </a:xfrm>
+          <a:prstGeom prst="bentConnector3">
+            <a:avLst>
+              <a:gd name="adj1" fmla="val 50000"/>
+            </a:avLst>
+          </a:prstGeom>
+          <a:ln>
+            <a:solidFill>
+              <a:schemeClr val="tx1"/>
+            </a:solidFill>
+            <a:tailEnd type="arrow"/>
+          </a:ln>
+        </p:spPr>
+        <p:style>
+          <a:lnRef idx="1">
+            <a:schemeClr val="accent1"/>
+          </a:lnRef>
+          <a:fillRef idx="0">
+            <a:schemeClr val="accent1"/>
+          </a:fillRef>
+          <a:effectRef idx="0">
+            <a:schemeClr val="accent1"/>
+          </a:effectRef>
+          <a:fontRef idx="minor">
+            <a:schemeClr val="tx1"/>
+          </a:fontRef>
+        </p:style>
+      </p:cxnSp>
+      <p:sp>
+        <p:nvSpPr>
+          <p:cNvPr id="65" name="TextBox 64"/>
+          <p:cNvSpPr txBox="1"/>
+          <p:nvPr/>
+        </p:nvSpPr>
+        <p:spPr>
+          <a:xfrm>
+            <a:off x="5029200" y="2362200"/>
+            <a:ext cx="1139286" cy="307777"/>
+          </a:xfrm>
+          <a:prstGeom prst="rect">
+            <a:avLst/>
+          </a:prstGeom>
+          <a:noFill/>
+        </p:spPr>
+        <p:txBody>
+          <a:bodyPr wrap="none" rtlCol="0">
+            <a:spAutoFit/>
+          </a:bodyPr>
+          <a:lstStyle/>
+          <a:p>
+            <a:r>
+              <a:rPr lang="en-US" sz="1400" dirty="0" smtClean="0"/>
+              <a:t>Do response </a:t>
+            </a:r>
+            <a:endParaRPr lang="en-US" sz="1400" dirty="0"/>
+          </a:p>
+        </p:txBody>
+      </p:sp>
+      <p:sp>
+        <p:nvSpPr>
+          <p:cNvPr id="69" name="TextBox 68"/>
+          <p:cNvSpPr txBox="1"/>
+          <p:nvPr/>
+        </p:nvSpPr>
+        <p:spPr>
+          <a:xfrm>
+            <a:off x="5638800" y="4572000"/>
+            <a:ext cx="301686" cy="369332"/>
+          </a:xfrm>
+          <a:prstGeom prst="rect">
+            <a:avLst/>
+          </a:prstGeom>
+          <a:noFill/>
+        </p:spPr>
+        <p:txBody>
+          <a:bodyPr wrap="none" rtlCol="0">
+            <a:spAutoFit/>
+          </a:bodyPr>
+          <a:lstStyle/>
+          <a:p>
+            <a:r>
+              <a:rPr lang="en-US" dirty="0" smtClean="0"/>
+              <a:t>1</a:t>
+            </a:r>
+            <a:endParaRPr lang="en-US" dirty="0"/>
+          </a:p>
+        </p:txBody>
+      </p:sp>
+      <p:cxnSp>
+        <p:nvCxnSpPr>
+          <p:cNvPr id="50" name="Elbow Connector 49"/>
+          <p:cNvCxnSpPr>
+            <a:endCxn id="2" idx="2"/>
+          </p:cNvCxnSpPr>
+          <p:nvPr/>
+        </p:nvCxnSpPr>
+        <p:spPr>
+          <a:xfrm>
+            <a:off x="3962400" y="4495800"/>
+            <a:ext cx="914400" cy="685800"/>
+          </a:xfrm>
+          <a:prstGeom prst="bentConnector3">
+            <a:avLst>
+              <a:gd name="adj1" fmla="val -3731"/>
+            </a:avLst>
+          </a:prstGeom>
+          <a:ln>
+            <a:solidFill>
+              <a:schemeClr val="tx1"/>
+            </a:solidFill>
+            <a:tailEnd type="arrow"/>
+          </a:ln>
+        </p:spPr>
+        <p:style>
+          <a:lnRef idx="1">
+            <a:schemeClr val="accent1"/>
+          </a:lnRef>
+          <a:fillRef idx="0">
+            <a:schemeClr val="accent1"/>
+          </a:fillRef>
+          <a:effectRef idx="0">
+            <a:schemeClr val="accent1"/>
+          </a:effectRef>
+          <a:fontRef idx="minor">
+            <a:schemeClr val="tx1"/>
+          </a:fontRef>
+        </p:style>
+      </p:cxnSp>
+      <p:sp>
+        <p:nvSpPr>
+          <p:cNvPr id="62" name="TextBox 61"/>
+          <p:cNvSpPr txBox="1"/>
+          <p:nvPr/>
+        </p:nvSpPr>
+        <p:spPr>
+          <a:xfrm>
+            <a:off x="3581400" y="5181600"/>
+            <a:ext cx="1425775" cy="307777"/>
+          </a:xfrm>
+          <a:prstGeom prst="rect">
+            <a:avLst/>
+          </a:prstGeom>
+          <a:noFill/>
+        </p:spPr>
+        <p:txBody>
+          <a:bodyPr wrap="none" rtlCol="0">
+            <a:spAutoFit/>
+          </a:bodyPr>
+          <a:lstStyle/>
+          <a:p>
+            <a:r>
+              <a:rPr lang="en-US" sz="1400" dirty="0" smtClean="0"/>
+              <a:t>Get Note Details </a:t>
+            </a:r>
+            <a:endParaRPr lang="en-US" sz="1400" dirty="0"/>
+          </a:p>
+        </p:txBody>
+      </p:sp>
+      <p:cxnSp>
+        <p:nvCxnSpPr>
+          <p:cNvPr id="66" name="Shape 65"/>
+          <p:cNvCxnSpPr>
+            <a:stCxn id="69" idx="0"/>
+            <a:endCxn id="24" idx="3"/>
+          </p:cNvCxnSpPr>
+          <p:nvPr/>
+        </p:nvCxnSpPr>
+        <p:spPr>
+          <a:xfrm rot="16200000" flipV="1">
+            <a:off x="4876022" y="3658378"/>
+            <a:ext cx="304800" cy="1522443"/>
+          </a:xfrm>
+          <a:prstGeom prst="bentConnector2">
+            <a:avLst/>
+          </a:prstGeom>
+          <a:ln>
+            <a:solidFill>
+              <a:schemeClr val="tx1"/>
+            </a:solidFill>
+            <a:tailEnd type="arrow"/>
+          </a:ln>
+        </p:spPr>
+        <p:style>
+          <a:lnRef idx="1">
+            <a:schemeClr val="accent1"/>
+          </a:lnRef>
+          <a:fillRef idx="0">
+            <a:schemeClr val="accent1"/>
+          </a:fillRef>
+          <a:effectRef idx="0">
+            <a:schemeClr val="accent1"/>
+          </a:effectRef>
+          <a:fontRef idx="minor">
+            <a:schemeClr val="tx1"/>
+          </a:fontRef>
+        </p:style>
+      </p:cxnSp>
+      <p:sp>
+        <p:nvSpPr>
+          <p:cNvPr id="67" name="TextBox 66"/>
+          <p:cNvSpPr txBox="1"/>
+          <p:nvPr/>
+        </p:nvSpPr>
+        <p:spPr>
+          <a:xfrm>
+            <a:off x="4419600" y="3733800"/>
+            <a:ext cx="1607299" cy="523220"/>
+          </a:xfrm>
+          <a:prstGeom prst="rect">
+            <a:avLst/>
+          </a:prstGeom>
+          <a:noFill/>
+        </p:spPr>
+        <p:txBody>
+          <a:bodyPr wrap="none" rtlCol="0">
+            <a:spAutoFit/>
+          </a:bodyPr>
+          <a:lstStyle/>
+          <a:p>
+            <a:r>
+              <a:rPr lang="en-US" sz="1400" dirty="0" smtClean="0"/>
+              <a:t>Update to selected </a:t>
+            </a:r>
+          </a:p>
+          <a:p>
+            <a:r>
+              <a:rPr lang="en-US" sz="1400" dirty="0" smtClean="0"/>
+              <a:t>social site</a:t>
+            </a:r>
+            <a:endParaRPr lang="en-US" sz="1400" dirty="0"/>
           </a:p>
         </p:txBody>
       </p:sp>

</xml_diff>